<commit_message>
docs: Se agrega nueva presentación
</commit_message>
<xml_diff>
--- a/01-Analisis/01-Componente metodologico/WEBANIMAL.pptx
+++ b/01-Analisis/01-Componente metodologico/WEBANIMAL.pptx
@@ -321,7 +321,7 @@
           <a:p>
             <a:fld id="{B3030C24-9424-B24A-8613-79990C3AA492}" type="datetimeFigureOut">
               <a:rPr lang="es-ES" smtClean="0"/>
-              <a:t>19/09/2020</a:t>
+              <a:t>29/07/2021</a:t>
             </a:fld>
             <a:endParaRPr lang="es-ES"/>
           </a:p>
@@ -501,7 +501,7 @@
           <a:p>
             <a:fld id="{B3030C24-9424-B24A-8613-79990C3AA492}" type="datetimeFigureOut">
               <a:rPr lang="es-ES" smtClean="0"/>
-              <a:t>19/09/2020</a:t>
+              <a:t>29/07/2021</a:t>
             </a:fld>
             <a:endParaRPr lang="es-ES"/>
           </a:p>
@@ -1137,7 +1137,7 @@
           <a:p>
             <a:fld id="{B3030C24-9424-B24A-8613-79990C3AA492}" type="datetimeFigureOut">
               <a:rPr lang="es-ES" smtClean="0"/>
-              <a:t>19/09/2020</a:t>
+              <a:t>29/07/2021</a:t>
             </a:fld>
             <a:endParaRPr lang="es-ES"/>
           </a:p>
@@ -1390,7 +1390,7 @@
           <a:p>
             <a:fld id="{B3030C24-9424-B24A-8613-79990C3AA492}" type="datetimeFigureOut">
               <a:rPr lang="es-ES" smtClean="0"/>
-              <a:t>19/09/2020</a:t>
+              <a:t>29/07/2021</a:t>
             </a:fld>
             <a:endParaRPr lang="es-ES"/>
           </a:p>
@@ -1603,7 +1603,7 @@
           <a:p>
             <a:fld id="{B3030C24-9424-B24A-8613-79990C3AA492}" type="datetimeFigureOut">
               <a:rPr lang="es-ES" smtClean="0"/>
-              <a:t>19/09/2020</a:t>
+              <a:t>29/07/2021</a:t>
             </a:fld>
             <a:endParaRPr lang="es-ES"/>
           </a:p>
@@ -2133,7 +2133,7 @@
         <p:spPr>
           <a:xfrm>
             <a:off x="5509452" y="2950170"/>
-            <a:ext cx="2756985" cy="1569660"/>
+            <a:ext cx="2756985" cy="1323439"/>
           </a:xfrm>
           <a:prstGeom prst="rect">
             <a:avLst/>
@@ -2158,61 +2158,6 @@
               </a:rPr>
               <a:t>Javier Mauricio Diaz Sanabria</a:t>
             </a:r>
-          </a:p>
-          <a:p>
-            <a:pPr algn="r"/>
-            <a:r>
-              <a:rPr lang="es-ES" sz="1600" dirty="0">
-                <a:solidFill>
-                  <a:schemeClr val="tx1">
-                    <a:lumMod val="75000"/>
-                    <a:lumOff val="25000"/>
-                  </a:schemeClr>
-                </a:solidFill>
-              </a:rPr>
-              <a:t>Cristian </a:t>
-            </a:r>
-            <a:r>
-              <a:rPr lang="es-ES" sz="1600" dirty="0" err="1">
-                <a:solidFill>
-                  <a:schemeClr val="tx1">
-                    <a:lumMod val="75000"/>
-                    <a:lumOff val="25000"/>
-                  </a:schemeClr>
-                </a:solidFill>
-              </a:rPr>
-              <a:t>Efenth</a:t>
-            </a:r>
-            <a:r>
-              <a:rPr lang="es-ES" sz="1600" dirty="0">
-                <a:solidFill>
-                  <a:schemeClr val="tx1">
-                    <a:lumMod val="75000"/>
-                    <a:lumOff val="25000"/>
-                  </a:schemeClr>
-                </a:solidFill>
-              </a:rPr>
-              <a:t> Niño </a:t>
-            </a:r>
-            <a:r>
-              <a:rPr lang="es-ES" sz="1600" dirty="0" err="1">
-                <a:solidFill>
-                  <a:schemeClr val="tx1">
-                    <a:lumMod val="75000"/>
-                    <a:lumOff val="25000"/>
-                  </a:schemeClr>
-                </a:solidFill>
-              </a:rPr>
-              <a:t>Baez</a:t>
-            </a:r>
-            <a:endParaRPr lang="es-ES" sz="1600" dirty="0">
-              <a:solidFill>
-                <a:schemeClr val="tx1">
-                  <a:lumMod val="75000"/>
-                  <a:lumOff val="25000"/>
-                </a:schemeClr>
-              </a:solidFill>
-            </a:endParaRPr>
           </a:p>
           <a:p>
             <a:pPr algn="r"/>
@@ -2357,13 +2302,21 @@
           <a:p>
             <a:pPr algn="just"/>
             <a:r>
+              <a:rPr lang="es-ES" sz="1600" dirty="0">
+                <a:solidFill>
+                  <a:srgbClr val="545454"/>
+                </a:solidFill>
+              </a:rPr>
+              <a:t>Es un aplicativo web para la adopción de mascotas, la idea de este es que </a:t>
+            </a:r>
+            <a:r>
               <a:rPr lang="es-ES" sz="1600" b="0" i="0" dirty="0">
                 <a:solidFill>
                   <a:srgbClr val="545454"/>
                 </a:solidFill>
                 <a:effectLst/>
               </a:rPr>
-              <a:t>Con solo un botón se puede descargar el formulario de adopción, pero también está la posibilidad de subir fotos de animales perdidos y que su búsqueda sea más fácil, lo que se suma a la sección de animales encontrados</a:t>
+              <a:t>está la posibilidad de subir fotos de animales perdidos y que su búsqueda sea más fácil, lo que se suma a la sección de animales encontrados</a:t>
             </a:r>
             <a:r>
               <a:rPr lang="es-ES" sz="1600" dirty="0">

</xml_diff>